<commit_message>
slight modification on the slides
</commit_message>
<xml_diff>
--- a/DSO 545 Final Project Presentation_group 6.pptx
+++ b/DSO 545 Final Project Presentation_group 6.pptx
@@ -15,11 +15,11 @@
     <p:sldId id="260" r:id="rId6"/>
     <p:sldId id="261" r:id="rId7"/>
     <p:sldId id="262" r:id="rId8"/>
-    <p:sldId id="263" r:id="rId9"/>
-    <p:sldId id="264" r:id="rId10"/>
-    <p:sldId id="265" r:id="rId11"/>
-    <p:sldId id="266" r:id="rId12"/>
-    <p:sldId id="267" r:id="rId13"/>
+    <p:sldId id="280" r:id="rId9"/>
+    <p:sldId id="281" r:id="rId10"/>
+    <p:sldId id="282" r:id="rId11"/>
+    <p:sldId id="283" r:id="rId12"/>
+    <p:sldId id="284" r:id="rId13"/>
     <p:sldId id="268" r:id="rId14"/>
     <p:sldId id="269" r:id="rId15"/>
     <p:sldId id="270" r:id="rId16"/>
@@ -618,7 +618,7 @@
   <p:cSld>
     <p:spTree>
       <p:nvGrpSpPr>
-        <p:cNvPr id="1" name="Shape 112"/>
+        <p:cNvPr id="1" name="Shape 111"/>
         <p:cNvGrpSpPr/>
         <p:nvPr/>
       </p:nvGrpSpPr>
@@ -632,7 +632,7 @@
       </p:grpSpPr>
       <p:sp>
         <p:nvSpPr>
-          <p:cNvPr id="113" name="Shape 113"/>
+          <p:cNvPr id="112" name="Shape 112"/>
           <p:cNvSpPr>
             <a:spLocks noGrp="1" noRot="1" noChangeAspect="1"/>
           </p:cNvSpPr>
@@ -673,7 +673,7 @@
       </p:sp>
       <p:sp>
         <p:nvSpPr>
-          <p:cNvPr id="114" name="Shape 114"/>
+          <p:cNvPr id="113" name="Shape 113"/>
           <p:cNvSpPr txBox="1">
             <a:spLocks noGrp="1"/>
           </p:cNvSpPr>
@@ -709,7 +709,7 @@
     </p:spTree>
     <p:extLst>
       <p:ext uri="{BB962C8B-B14F-4D97-AF65-F5344CB8AC3E}">
-        <p14:creationId xmlns:p14="http://schemas.microsoft.com/office/powerpoint/2010/main" val="1028488014"/>
+        <p14:creationId xmlns:p14="http://schemas.microsoft.com/office/powerpoint/2010/main" val="1365141490"/>
       </p:ext>
     </p:extLst>
   </p:cSld>
@@ -724,7 +724,7 @@
   <p:cSld>
     <p:spTree>
       <p:nvGrpSpPr>
-        <p:cNvPr id="1" name="Shape 119"/>
+        <p:cNvPr id="1" name="Shape 117"/>
         <p:cNvGrpSpPr/>
         <p:nvPr/>
       </p:nvGrpSpPr>
@@ -738,7 +738,7 @@
       </p:grpSpPr>
       <p:sp>
         <p:nvSpPr>
-          <p:cNvPr id="120" name="Shape 120"/>
+          <p:cNvPr id="118" name="Shape 118"/>
           <p:cNvSpPr>
             <a:spLocks noGrp="1" noRot="1" noChangeAspect="1"/>
           </p:cNvSpPr>
@@ -779,7 +779,7 @@
       </p:sp>
       <p:sp>
         <p:nvSpPr>
-          <p:cNvPr id="121" name="Shape 121"/>
+          <p:cNvPr id="119" name="Shape 119"/>
           <p:cNvSpPr txBox="1">
             <a:spLocks noGrp="1"/>
           </p:cNvSpPr>
@@ -815,7 +815,7 @@
     </p:spTree>
     <p:extLst>
       <p:ext uri="{BB962C8B-B14F-4D97-AF65-F5344CB8AC3E}">
-        <p14:creationId xmlns:p14="http://schemas.microsoft.com/office/powerpoint/2010/main" val="702176595"/>
+        <p14:creationId xmlns:p14="http://schemas.microsoft.com/office/powerpoint/2010/main" val="208448286"/>
       </p:ext>
     </p:extLst>
   </p:cSld>
@@ -830,7 +830,7 @@
   <p:cSld>
     <p:spTree>
       <p:nvGrpSpPr>
-        <p:cNvPr id="1" name="Shape 126"/>
+        <p:cNvPr id="1" name="Shape 123"/>
         <p:cNvGrpSpPr/>
         <p:nvPr/>
       </p:nvGrpSpPr>
@@ -844,7 +844,7 @@
       </p:grpSpPr>
       <p:sp>
         <p:nvSpPr>
-          <p:cNvPr id="127" name="Shape 127"/>
+          <p:cNvPr id="124" name="Shape 124"/>
           <p:cNvSpPr>
             <a:spLocks noGrp="1" noRot="1" noChangeAspect="1"/>
           </p:cNvSpPr>
@@ -885,7 +885,7 @@
       </p:sp>
       <p:sp>
         <p:nvSpPr>
-          <p:cNvPr id="128" name="Shape 128"/>
+          <p:cNvPr id="125" name="Shape 125"/>
           <p:cNvSpPr txBox="1">
             <a:spLocks noGrp="1"/>
           </p:cNvSpPr>
@@ -921,7 +921,7 @@
     </p:spTree>
     <p:extLst>
       <p:ext uri="{BB962C8B-B14F-4D97-AF65-F5344CB8AC3E}">
-        <p14:creationId xmlns:p14="http://schemas.microsoft.com/office/powerpoint/2010/main" val="1059391900"/>
+        <p14:creationId xmlns:p14="http://schemas.microsoft.com/office/powerpoint/2010/main" val="1036534792"/>
       </p:ext>
     </p:extLst>
   </p:cSld>
@@ -2935,7 +2935,7 @@
     </p:spTree>
     <p:extLst>
       <p:ext uri="{BB962C8B-B14F-4D97-AF65-F5344CB8AC3E}">
-        <p14:creationId xmlns:p14="http://schemas.microsoft.com/office/powerpoint/2010/main" val="1925035904"/>
+        <p14:creationId xmlns:p14="http://schemas.microsoft.com/office/powerpoint/2010/main" val="1160189067"/>
       </p:ext>
     </p:extLst>
   </p:cSld>
@@ -2950,7 +2950,7 @@
   <p:cSld>
     <p:spTree>
       <p:nvGrpSpPr>
-        <p:cNvPr id="1" name="Shape 105"/>
+        <p:cNvPr id="1" name="Shape 104"/>
         <p:cNvGrpSpPr/>
         <p:nvPr/>
       </p:nvGrpSpPr>
@@ -2964,7 +2964,7 @@
       </p:grpSpPr>
       <p:sp>
         <p:nvSpPr>
-          <p:cNvPr id="106" name="Shape 106"/>
+          <p:cNvPr id="105" name="Shape 105"/>
           <p:cNvSpPr>
             <a:spLocks noGrp="1" noRot="1" noChangeAspect="1"/>
           </p:cNvSpPr>
@@ -3005,7 +3005,7 @@
       </p:sp>
       <p:sp>
         <p:nvSpPr>
-          <p:cNvPr id="107" name="Shape 107"/>
+          <p:cNvPr id="106" name="Shape 106"/>
           <p:cNvSpPr txBox="1">
             <a:spLocks noGrp="1"/>
           </p:cNvSpPr>
@@ -3041,7 +3041,7 @@
     </p:spTree>
     <p:extLst>
       <p:ext uri="{BB962C8B-B14F-4D97-AF65-F5344CB8AC3E}">
-        <p14:creationId xmlns:p14="http://schemas.microsoft.com/office/powerpoint/2010/main" val="1950646388"/>
+        <p14:creationId xmlns:p14="http://schemas.microsoft.com/office/powerpoint/2010/main" val="1505522842"/>
       </p:ext>
     </p:extLst>
   </p:cSld>
@@ -7312,6 +7312,13 @@
   <p:clrMapOvr>
     <a:masterClrMapping/>
   </p:clrMapOvr>
+  <p:timing>
+    <p:tnLst>
+      <p:par>
+        <p:cTn id="1" dur="indefinite" restart="never" nodeType="tmRoot"/>
+      </p:par>
+    </p:tnLst>
+  </p:timing>
 </p:sld>
 </file>
 
@@ -7320,7 +7327,7 @@
   <p:cSld>
     <p:spTree>
       <p:nvGrpSpPr>
-        <p:cNvPr id="1" name="Shape 115"/>
+        <p:cNvPr id="1" name="Shape 114"/>
         <p:cNvGrpSpPr/>
         <p:nvPr/>
       </p:nvGrpSpPr>
@@ -7334,45 +7341,7 @@
       </p:grpSpPr>
       <p:sp>
         <p:nvSpPr>
-          <p:cNvPr id="116" name="Shape 116"/>
-          <p:cNvSpPr txBox="1">
-            <a:spLocks noGrp="1"/>
-          </p:cNvSpPr>
-          <p:nvPr>
-            <p:ph type="title"/>
-          </p:nvPr>
-        </p:nvSpPr>
-        <p:spPr>
-          <a:xfrm>
-            <a:off x="311700" y="391350"/>
-            <a:ext cx="8520600" cy="626100"/>
-          </a:xfrm>
-          <a:prstGeom prst="rect">
-            <a:avLst/>
-          </a:prstGeom>
-        </p:spPr>
-        <p:txBody>
-          <a:bodyPr lIns="91425" tIns="91425" rIns="91425" bIns="91425" anchor="t" anchorCtr="0">
-            <a:noAutofit/>
-          </a:bodyPr>
-          <a:lstStyle/>
-          <a:p>
-            <a:pPr lvl="0">
-              <a:spcBef>
-                <a:spcPts val="0"/>
-              </a:spcBef>
-              <a:buNone/>
-            </a:pPr>
-            <a:r>
-              <a:rPr lang="en"/>
-              <a:t>Distribution of Requests</a:t>
-            </a:r>
-          </a:p>
-        </p:txBody>
-      </p:sp>
-      <p:sp>
-        <p:nvSpPr>
-          <p:cNvPr id="117" name="Shape 117"/>
+          <p:cNvPr id="115" name="Shape 115"/>
           <p:cNvSpPr txBox="1">
             <a:spLocks noGrp="1"/>
           </p:cNvSpPr>
@@ -7382,8 +7351,8 @@
         </p:nvSpPr>
         <p:spPr>
           <a:xfrm>
-            <a:off x="5385750" y="1152475"/>
-            <a:ext cx="3370200" cy="3416400"/>
+            <a:off x="639900" y="4431575"/>
+            <a:ext cx="7864200" cy="711900"/>
           </a:xfrm>
           <a:prstGeom prst="rect">
             <a:avLst/>
@@ -7419,7 +7388,7 @@
                 <a:cs typeface="Arial"/>
                 <a:sym typeface="Arial"/>
               </a:rPr>
-              <a:t>Majority of requests are from phone calls, followed by Driver self report, Mobile App, Self service and Email</a:t>
+              <a:t>Total number of requests by request source</a:t>
             </a:r>
           </a:p>
           <a:p>
@@ -7447,14 +7416,14 @@
                 <a:cs typeface="Arial"/>
                 <a:sym typeface="Arial"/>
               </a:rPr>
-              <a:t>Requests from City Attorney and TDD are the least because of their particularity</a:t>
+              <a:t>Majority of requests came from phone calls, followed by Driver self report, Mobile App</a:t>
             </a:r>
           </a:p>
         </p:txBody>
       </p:sp>
       <p:pic>
         <p:nvPicPr>
-          <p:cNvPr id="118" name="Shape 118"/>
+          <p:cNvPr id="116" name="Shape 116"/>
           <p:cNvPicPr preferRelativeResize="0"/>
           <p:nvPr/>
         </p:nvPicPr>
@@ -7467,8 +7436,8 @@
         </p:blipFill>
         <p:spPr>
           <a:xfrm>
-            <a:off x="152400" y="1152475"/>
-            <a:ext cx="5153025" cy="3619500"/>
+            <a:off x="934075" y="0"/>
+            <a:ext cx="6453049" cy="4532650"/>
           </a:xfrm>
           <a:prstGeom prst="rect">
             <a:avLst/>
@@ -7480,10 +7449,22 @@
         </p:spPr>
       </p:pic>
     </p:spTree>
+    <p:extLst>
+      <p:ext uri="{BB962C8B-B14F-4D97-AF65-F5344CB8AC3E}">
+        <p14:creationId xmlns:p14="http://schemas.microsoft.com/office/powerpoint/2010/main" val="1670076540"/>
+      </p:ext>
+    </p:extLst>
   </p:cSld>
   <p:clrMapOvr>
     <a:masterClrMapping/>
   </p:clrMapOvr>
+  <p:timing>
+    <p:tnLst>
+      <p:par>
+        <p:cTn id="1" dur="indefinite" restart="never" nodeType="tmRoot"/>
+      </p:par>
+    </p:tnLst>
+  </p:timing>
 </p:sld>
 </file>
 
@@ -7492,7 +7473,7 @@
   <p:cSld>
     <p:spTree>
       <p:nvGrpSpPr>
-        <p:cNvPr id="1" name="Shape 122"/>
+        <p:cNvPr id="1" name="Shape 120"/>
         <p:cNvGrpSpPr/>
         <p:nvPr/>
       </p:nvGrpSpPr>
@@ -7506,45 +7487,7 @@
       </p:grpSpPr>
       <p:sp>
         <p:nvSpPr>
-          <p:cNvPr id="123" name="Shape 123"/>
-          <p:cNvSpPr txBox="1">
-            <a:spLocks noGrp="1"/>
-          </p:cNvSpPr>
-          <p:nvPr>
-            <p:ph type="title"/>
-          </p:nvPr>
-        </p:nvSpPr>
-        <p:spPr>
-          <a:xfrm>
-            <a:off x="311700" y="391350"/>
-            <a:ext cx="8520600" cy="626100"/>
-          </a:xfrm>
-          <a:prstGeom prst="rect">
-            <a:avLst/>
-          </a:prstGeom>
-        </p:spPr>
-        <p:txBody>
-          <a:bodyPr lIns="91425" tIns="91425" rIns="91425" bIns="91425" anchor="t" anchorCtr="0">
-            <a:noAutofit/>
-          </a:bodyPr>
-          <a:lstStyle/>
-          <a:p>
-            <a:pPr lvl="0">
-              <a:spcBef>
-                <a:spcPts val="0"/>
-              </a:spcBef>
-              <a:buNone/>
-            </a:pPr>
-            <a:r>
-              <a:rPr lang="en"/>
-              <a:t>Distribution of Requests</a:t>
-            </a:r>
-          </a:p>
-        </p:txBody>
-      </p:sp>
-      <p:sp>
-        <p:nvSpPr>
-          <p:cNvPr id="124" name="Shape 124"/>
+          <p:cNvPr id="121" name="Shape 121"/>
           <p:cNvSpPr txBox="1">
             <a:spLocks noGrp="1"/>
           </p:cNvSpPr>
@@ -7554,8 +7497,8 @@
         </p:nvSpPr>
         <p:spPr>
           <a:xfrm>
-            <a:off x="5180275" y="1152475"/>
-            <a:ext cx="3651900" cy="3416400"/>
+            <a:off x="450450" y="4172925"/>
+            <a:ext cx="8243100" cy="1130100"/>
           </a:xfrm>
           <a:prstGeom prst="rect">
             <a:avLst/>
@@ -7582,7 +7525,7 @@
               <a:buChar char="•"/>
             </a:pPr>
             <a:r>
-              <a:rPr lang="en" sz="1400" dirty="0">
+              <a:rPr lang="en" sz="1400">
                 <a:solidFill>
                   <a:srgbClr val="000000"/>
                 </a:solidFill>
@@ -7591,7 +7534,7 @@
                 <a:cs typeface="Arial"/>
                 <a:sym typeface="Arial"/>
               </a:rPr>
-              <a:t>Although most requests are from calls, the average response time is shorter than those from other sources</a:t>
+              <a:t>Average processing time of requests by request source</a:t>
             </a:r>
           </a:p>
           <a:p>
@@ -7619,7 +7562,7 @@
                 <a:cs typeface="Arial"/>
                 <a:sym typeface="Arial"/>
               </a:rPr>
-              <a:t>Most efficient source is Driver Self Report</a:t>
+              <a:t>Letter is the least efficient way of submitting a request</a:t>
             </a:r>
           </a:p>
           <a:p>
@@ -7647,42 +7590,14 @@
                 <a:cs typeface="Arial"/>
                 <a:sym typeface="Arial"/>
               </a:rPr>
-              <a:t>Calls are more effective than mobile apps</a:t>
-            </a:r>
-          </a:p>
-          <a:p>
-            <a:pPr marL="457200" lvl="0" indent="-317500">
-              <a:spcBef>
-                <a:spcPts val="0"/>
-              </a:spcBef>
-              <a:spcAft>
-                <a:spcPts val="0"/>
-              </a:spcAft>
-              <a:buClr>
-                <a:srgbClr val="000000"/>
-              </a:buClr>
-              <a:buSzPct val="100000"/>
-              <a:buFont typeface="Arial" charset="0"/>
-              <a:buChar char="•"/>
-            </a:pPr>
-            <a:r>
-              <a:rPr lang="en" sz="1400" dirty="0">
-                <a:solidFill>
-                  <a:srgbClr val="000000"/>
-                </a:solidFill>
-                <a:latin typeface="Arial"/>
-                <a:ea typeface="Arial"/>
-                <a:cs typeface="Arial"/>
-                <a:sym typeface="Arial"/>
-              </a:rPr>
-              <a:t>Some samples of sources are too small to conclude general results, and the efficiency also depends on request types to a great extent</a:t>
+              <a:t>Call / Driver Self Report are quite efficient</a:t>
             </a:r>
           </a:p>
         </p:txBody>
       </p:sp>
       <p:pic>
         <p:nvPicPr>
-          <p:cNvPr id="125" name="Shape 125"/>
+          <p:cNvPr id="122" name="Shape 122"/>
           <p:cNvPicPr preferRelativeResize="0"/>
           <p:nvPr/>
         </p:nvPicPr>
@@ -7690,13 +7605,13 @@
           <a:blip r:embed="rId3">
             <a:alphaModFix/>
           </a:blip>
-          <a:srcRect r="-9817" b="-4090"/>
+          <a:srcRect r="-2722" b="2647"/>
           <a:stretch/>
         </p:blipFill>
         <p:spPr>
           <a:xfrm>
-            <a:off x="152400" y="1169850"/>
-            <a:ext cx="4875475" cy="3453119"/>
+            <a:off x="1329975" y="76200"/>
+            <a:ext cx="5965775" cy="4225350"/>
           </a:xfrm>
           <a:prstGeom prst="rect">
             <a:avLst/>
@@ -7708,10 +7623,22 @@
         </p:spPr>
       </p:pic>
     </p:spTree>
+    <p:extLst>
+      <p:ext uri="{BB962C8B-B14F-4D97-AF65-F5344CB8AC3E}">
+        <p14:creationId xmlns:p14="http://schemas.microsoft.com/office/powerpoint/2010/main" val="217737882"/>
+      </p:ext>
+    </p:extLst>
   </p:cSld>
   <p:clrMapOvr>
     <a:masterClrMapping/>
   </p:clrMapOvr>
+  <p:timing>
+    <p:tnLst>
+      <p:par>
+        <p:cTn id="1" dur="indefinite" restart="never" nodeType="tmRoot"/>
+      </p:par>
+    </p:tnLst>
+  </p:timing>
 </p:sld>
 </file>
 
@@ -7720,7 +7647,7 @@
   <p:cSld>
     <p:spTree>
       <p:nvGrpSpPr>
-        <p:cNvPr id="1" name="Shape 129"/>
+        <p:cNvPr id="1" name="Shape 126"/>
         <p:cNvGrpSpPr/>
         <p:nvPr/>
       </p:nvGrpSpPr>
@@ -7734,7 +7661,7 @@
       </p:grpSpPr>
       <p:sp>
         <p:nvSpPr>
-          <p:cNvPr id="130" name="Shape 130"/>
+          <p:cNvPr id="127" name="Shape 127"/>
           <p:cNvSpPr txBox="1">
             <a:spLocks noGrp="1"/>
           </p:cNvSpPr>
@@ -7772,7 +7699,7 @@
       </p:sp>
       <p:sp>
         <p:nvSpPr>
-          <p:cNvPr id="131" name="Shape 131"/>
+          <p:cNvPr id="128" name="Shape 128"/>
           <p:cNvSpPr txBox="1">
             <a:spLocks noGrp="1"/>
           </p:cNvSpPr>
@@ -7782,8 +7709,8 @@
         </p:nvSpPr>
         <p:spPr>
           <a:xfrm>
-            <a:off x="5743600" y="1152475"/>
-            <a:ext cx="3088800" cy="3416400"/>
+            <a:off x="5847475" y="1152475"/>
+            <a:ext cx="2985000" cy="3416400"/>
           </a:xfrm>
           <a:prstGeom prst="rect">
             <a:avLst/>
@@ -7810,7 +7737,7 @@
               <a:buChar char="•"/>
             </a:pPr>
             <a:r>
-              <a:rPr lang="en" sz="1400" dirty="0">
+              <a:rPr lang="en" sz="1400">
                 <a:solidFill>
                   <a:srgbClr val="000000"/>
                 </a:solidFill>
@@ -7819,11 +7746,11 @@
                 <a:cs typeface="Arial"/>
                 <a:sym typeface="Arial"/>
               </a:rPr>
-              <a:t>Most popular combination of request type and source is bulky items from call, Graffiti removal from driver self report, bulky items from mobile app and metal/household appliances from call</a:t>
+              <a:t>Number of requests by request source and request type</a:t>
             </a:r>
           </a:p>
           <a:p>
-            <a:pPr marL="457200" lvl="0" indent="-317500">
+            <a:pPr marL="457200" lvl="0" indent="-317500" rtl="0">
               <a:spcBef>
                 <a:spcPts val="0"/>
               </a:spcBef>
@@ -7847,10 +7774,26 @@
                 <a:cs typeface="Arial"/>
                 <a:sym typeface="Arial"/>
               </a:rPr>
-              <a:t>Sources of call, mobile app, self service</a:t>
+              <a:t>Darker color represents higher frequency</a:t>
             </a:r>
+          </a:p>
+          <a:p>
+            <a:pPr marL="457200" lvl="0" indent="-317500" rtl="0">
+              <a:spcBef>
+                <a:spcPts val="0"/>
+              </a:spcBef>
+              <a:spcAft>
+                <a:spcPts val="0"/>
+              </a:spcAft>
+              <a:buClr>
+                <a:srgbClr val="000000"/>
+              </a:buClr>
+              <a:buSzPct val="100000"/>
+              <a:buFont typeface="Arial" charset="0"/>
+              <a:buChar char="•"/>
+            </a:pPr>
             <a:r>
-              <a:rPr lang="en" sz="1400" dirty="0" smtClean="0">
+              <a:rPr lang="en" sz="1400" dirty="0">
                 <a:solidFill>
                   <a:srgbClr val="000000"/>
                 </a:solidFill>
@@ -7859,98 +7802,14 @@
                 <a:cs typeface="Arial"/>
                 <a:sym typeface="Arial"/>
               </a:rPr>
-              <a:t>,</a:t>
-            </a:r>
-            <a:r>
-              <a:rPr lang="zh-CN" altLang="en-US" sz="1400" dirty="0" smtClean="0">
-                <a:solidFill>
-                  <a:srgbClr val="000000"/>
-                </a:solidFill>
-                <a:latin typeface="Arial"/>
-                <a:ea typeface="Arial"/>
-                <a:cs typeface="Arial"/>
-                <a:sym typeface="Arial"/>
-              </a:rPr>
-              <a:t> </a:t>
-            </a:r>
-            <a:r>
-              <a:rPr lang="en" sz="1400" dirty="0" smtClean="0">
-                <a:solidFill>
-                  <a:srgbClr val="000000"/>
-                </a:solidFill>
-                <a:latin typeface="Arial"/>
-                <a:ea typeface="Arial"/>
-                <a:cs typeface="Arial"/>
-                <a:sym typeface="Arial"/>
-              </a:rPr>
-              <a:t>voicemail,</a:t>
-            </a:r>
-            <a:r>
-              <a:rPr lang="zh-CN" altLang="en-US" sz="1400" dirty="0" smtClean="0">
-                <a:solidFill>
-                  <a:srgbClr val="000000"/>
-                </a:solidFill>
-                <a:latin typeface="Arial"/>
-                <a:ea typeface="Arial"/>
-                <a:cs typeface="Arial"/>
-                <a:sym typeface="Arial"/>
-              </a:rPr>
-              <a:t> </a:t>
-            </a:r>
-            <a:r>
-              <a:rPr lang="en-US" altLang="zh-CN" sz="1400" dirty="0" smtClean="0">
-                <a:solidFill>
-                  <a:srgbClr val="000000"/>
-                </a:solidFill>
-                <a:latin typeface="Arial"/>
-                <a:ea typeface="Arial"/>
-                <a:cs typeface="Arial"/>
-                <a:sym typeface="Arial"/>
-              </a:rPr>
-              <a:t>and</a:t>
-            </a:r>
-            <a:r>
-              <a:rPr lang="zh-CN" altLang="en-US" sz="1400" dirty="0" smtClean="0">
-                <a:solidFill>
-                  <a:srgbClr val="000000"/>
-                </a:solidFill>
-                <a:latin typeface="Arial"/>
-                <a:ea typeface="Arial"/>
-                <a:cs typeface="Arial"/>
-                <a:sym typeface="Arial"/>
-              </a:rPr>
-              <a:t> </a:t>
-            </a:r>
-            <a:r>
-              <a:rPr lang="en" sz="1400" dirty="0" smtClean="0">
-                <a:solidFill>
-                  <a:srgbClr val="000000"/>
-                </a:solidFill>
-                <a:latin typeface="Arial"/>
-                <a:ea typeface="Arial"/>
-                <a:cs typeface="Arial"/>
-                <a:sym typeface="Arial"/>
-              </a:rPr>
-              <a:t> </a:t>
-            </a:r>
-            <a:r>
-              <a:rPr lang="en" sz="1400" dirty="0">
-                <a:solidFill>
-                  <a:srgbClr val="000000"/>
-                </a:solidFill>
-                <a:latin typeface="Arial"/>
-                <a:ea typeface="Arial"/>
-                <a:cs typeface="Arial"/>
-                <a:sym typeface="Arial"/>
-              </a:rPr>
-              <a:t>Council’s office are widely used for almost every type of requests though the total count of the last two is small</a:t>
+              <a:t>Most popular combinations are bulky items request from call, Graffiti removal from driver self report</a:t>
             </a:r>
           </a:p>
         </p:txBody>
       </p:sp>
       <p:pic>
         <p:nvPicPr>
-          <p:cNvPr id="132" name="Shape 132"/>
+          <p:cNvPr id="129" name="Shape 129"/>
           <p:cNvPicPr preferRelativeResize="0"/>
           <p:nvPr/>
         </p:nvPicPr>
@@ -7964,8 +7823,8 @@
         </p:blipFill>
         <p:spPr>
           <a:xfrm>
-            <a:off x="159300" y="1070875"/>
-            <a:ext cx="5534025" cy="3933825"/>
+            <a:off x="159300" y="994675"/>
+            <a:ext cx="5606950" cy="3985675"/>
           </a:xfrm>
           <a:prstGeom prst="rect">
             <a:avLst/>
@@ -7977,10 +7836,22 @@
         </p:spPr>
       </p:pic>
     </p:spTree>
+    <p:extLst>
+      <p:ext uri="{BB962C8B-B14F-4D97-AF65-F5344CB8AC3E}">
+        <p14:creationId xmlns:p14="http://schemas.microsoft.com/office/powerpoint/2010/main" val="844514545"/>
+      </p:ext>
+    </p:extLst>
   </p:cSld>
   <p:clrMapOvr>
     <a:masterClrMapping/>
   </p:clrMapOvr>
+  <p:timing>
+    <p:tnLst>
+      <p:par>
+        <p:cTn id="1" dur="indefinite" restart="never" nodeType="tmRoot"/>
+      </p:par>
+    </p:tnLst>
+  </p:timing>
 </p:sld>
 </file>
 
@@ -8044,6 +7915,13 @@
   <p:clrMapOvr>
     <a:masterClrMapping/>
   </p:clrMapOvr>
+  <p:timing>
+    <p:tnLst>
+      <p:par>
+        <p:cTn id="1" dur="indefinite" restart="never" nodeType="tmRoot"/>
+      </p:par>
+    </p:tnLst>
+  </p:timing>
 </p:sld>
 </file>
 
@@ -8329,6 +8207,13 @@
   <p:clrMapOvr>
     <a:masterClrMapping/>
   </p:clrMapOvr>
+  <p:timing>
+    <p:tnLst>
+      <p:par>
+        <p:cTn id="1" dur="indefinite" restart="never" nodeType="tmRoot"/>
+      </p:par>
+    </p:tnLst>
+  </p:timing>
 </p:sld>
 </file>
 
@@ -8558,6 +8443,13 @@
   <p:clrMapOvr>
     <a:masterClrMapping/>
   </p:clrMapOvr>
+  <p:timing>
+    <p:tnLst>
+      <p:par>
+        <p:cTn id="1" dur="indefinite" restart="never" nodeType="tmRoot"/>
+      </p:par>
+    </p:tnLst>
+  </p:timing>
 </p:sld>
 </file>
 
@@ -8761,6 +8653,13 @@
   <p:clrMapOvr>
     <a:masterClrMapping/>
   </p:clrMapOvr>
+  <p:timing>
+    <p:tnLst>
+      <p:par>
+        <p:cTn id="1" dur="indefinite" restart="never" nodeType="tmRoot"/>
+      </p:par>
+    </p:tnLst>
+  </p:timing>
 </p:sld>
 </file>
 
@@ -8999,6 +8898,13 @@
   <p:clrMapOvr>
     <a:masterClrMapping/>
   </p:clrMapOvr>
+  <p:timing>
+    <p:tnLst>
+      <p:par>
+        <p:cTn id="1" dur="indefinite" restart="never" nodeType="tmRoot"/>
+      </p:par>
+    </p:tnLst>
+  </p:timing>
 </p:sld>
 </file>
 
@@ -9062,6 +8968,13 @@
   <p:clrMapOvr>
     <a:masterClrMapping/>
   </p:clrMapOvr>
+  <p:timing>
+    <p:tnLst>
+      <p:par>
+        <p:cTn id="1" dur="indefinite" restart="never" nodeType="tmRoot"/>
+      </p:par>
+    </p:tnLst>
+  </p:timing>
 </p:sld>
 </file>
 
@@ -9347,6 +9260,13 @@
   <p:clrMapOvr>
     <a:masterClrMapping/>
   </p:clrMapOvr>
+  <p:timing>
+    <p:tnLst>
+      <p:par>
+        <p:cTn id="1" dur="indefinite" restart="never" nodeType="tmRoot"/>
+      </p:par>
+    </p:tnLst>
+  </p:timing>
 </p:sld>
 </file>
 
@@ -9548,6 +9468,13 @@
   <p:clrMapOvr>
     <a:masterClrMapping/>
   </p:clrMapOvr>
+  <p:timing>
+    <p:tnLst>
+      <p:par>
+        <p:cTn id="1" dur="indefinite" restart="never" nodeType="tmRoot"/>
+      </p:par>
+    </p:tnLst>
+  </p:timing>
 </p:sld>
 </file>
 
@@ -9683,7 +9610,55 @@
                 <a:cs typeface="Arial"/>
                 <a:sym typeface="Arial"/>
               </a:rPr>
-              <a:t>Proportion of Graffiti Removal requests is negatively correlated with median income, proportion of Metal/Household Appliances requests is positively correlation with median income and median age</a:t>
+              <a:t>Proportion of Graffiti Removal requests is negatively correlated with median income, proportion of Metal/Household Appliances requests is positively </a:t>
+            </a:r>
+            <a:r>
+              <a:rPr lang="en-US" altLang="zh-CN" sz="1400" dirty="0" smtClean="0">
+                <a:solidFill>
+                  <a:srgbClr val="000000"/>
+                </a:solidFill>
+                <a:latin typeface="Arial"/>
+                <a:ea typeface="Arial"/>
+                <a:cs typeface="Arial"/>
+                <a:sym typeface="Arial"/>
+              </a:rPr>
+              <a:t>correlated</a:t>
+            </a:r>
+            <a:r>
+              <a:rPr lang="zh-CN" altLang="en-US" sz="1400" dirty="0" smtClean="0">
+                <a:solidFill>
+                  <a:srgbClr val="000000"/>
+                </a:solidFill>
+                <a:latin typeface="Arial"/>
+                <a:ea typeface="Arial"/>
+                <a:cs typeface="Arial"/>
+                <a:sym typeface="Arial"/>
+              </a:rPr>
+              <a:t> </a:t>
+            </a:r>
+            <a:r>
+              <a:rPr lang="en" sz="1400" dirty="0" smtClean="0">
+                <a:solidFill>
+                  <a:srgbClr val="000000"/>
+                </a:solidFill>
+                <a:latin typeface="Arial"/>
+                <a:ea typeface="Arial"/>
+                <a:cs typeface="Arial"/>
+                <a:sym typeface="Arial"/>
+              </a:rPr>
+              <a:t>with </a:t>
+            </a:r>
+            <a:r>
+              <a:rPr lang="en" sz="1400" dirty="0">
+                <a:solidFill>
+                  <a:srgbClr val="000000"/>
+                </a:solidFill>
+                <a:latin typeface="Arial"/>
+                <a:ea typeface="Arial"/>
+                <a:cs typeface="Arial"/>
+                <a:sym typeface="Arial"/>
+              </a:rPr>
+              <a:t>median income and median age</a:t>
             </a:r>
           </a:p>
           <a:p>
@@ -9870,6 +9845,13 @@
   <p:clrMapOvr>
     <a:masterClrMapping/>
   </p:clrMapOvr>
+  <p:timing>
+    <p:tnLst>
+      <p:par>
+        <p:cTn id="1" dur="indefinite" restart="never" nodeType="tmRoot"/>
+      </p:par>
+    </p:tnLst>
+  </p:timing>
 </p:sld>
 </file>
 
@@ -9933,6 +9915,13 @@
   <p:clrMapOvr>
     <a:masterClrMapping/>
   </p:clrMapOvr>
+  <p:timing>
+    <p:tnLst>
+      <p:par>
+        <p:cTn id="1" dur="indefinite" restart="never" nodeType="tmRoot"/>
+      </p:par>
+    </p:tnLst>
+  </p:timing>
 </p:sld>
 </file>
 
@@ -10245,6 +10234,13 @@
   <p:clrMapOvr>
     <a:masterClrMapping/>
   </p:clrMapOvr>
+  <p:timing>
+    <p:tnLst>
+      <p:par>
+        <p:cTn id="1" dur="indefinite" restart="never" nodeType="tmRoot"/>
+      </p:par>
+    </p:tnLst>
+  </p:timing>
 </p:sld>
 </file>
 
@@ -10512,7 +10508,43 @@
                 <a:cs typeface="Arial"/>
                 <a:sym typeface="Arial"/>
               </a:rPr>
-              <a:t>Allocate more resources to low income and high employment areas</a:t>
+              <a:t>Allocate more resources to low income and high </a:t>
+            </a:r>
+            <a:r>
+              <a:rPr lang="en-US" altLang="zh-CN" sz="1400" smtClean="0">
+                <a:solidFill>
+                  <a:srgbClr val="000000"/>
+                </a:solidFill>
+                <a:latin typeface="Arial"/>
+                <a:ea typeface="Arial"/>
+                <a:cs typeface="Arial"/>
+                <a:sym typeface="Arial"/>
+              </a:rPr>
+              <a:t>un</a:t>
+            </a:r>
+            <a:r>
+              <a:rPr lang="en" sz="1400" smtClean="0">
+                <a:solidFill>
+                  <a:srgbClr val="000000"/>
+                </a:solidFill>
+                <a:latin typeface="Arial"/>
+                <a:ea typeface="Arial"/>
+                <a:cs typeface="Arial"/>
+                <a:sym typeface="Arial"/>
+              </a:rPr>
+              <a:t>employment </a:t>
+            </a:r>
+            <a:r>
+              <a:rPr lang="en" sz="1400" dirty="0">
+                <a:solidFill>
+                  <a:srgbClr val="000000"/>
+                </a:solidFill>
+                <a:latin typeface="Arial"/>
+                <a:ea typeface="Arial"/>
+                <a:cs typeface="Arial"/>
+                <a:sym typeface="Arial"/>
+              </a:rPr>
+              <a:t>areas</a:t>
             </a:r>
           </a:p>
           <a:p>
@@ -10606,6 +10638,13 @@
   <p:clrMapOvr>
     <a:masterClrMapping/>
   </p:clrMapOvr>
+  <p:timing>
+    <p:tnLst>
+      <p:par>
+        <p:cTn id="1" dur="indefinite" restart="never" nodeType="tmRoot"/>
+      </p:par>
+    </p:tnLst>
+  </p:timing>
 </p:sld>
 </file>
 
@@ -10669,6 +10708,13 @@
   <p:clrMapOvr>
     <a:masterClrMapping/>
   </p:clrMapOvr>
+  <p:timing>
+    <p:tnLst>
+      <p:par>
+        <p:cTn id="1" dur="indefinite" restart="never" nodeType="tmRoot"/>
+      </p:par>
+    </p:tnLst>
+  </p:timing>
 </p:sld>
 </file>
 
@@ -11064,6 +11110,13 @@
   <p:clrMapOvr>
     <a:masterClrMapping/>
   </p:clrMapOvr>
+  <p:timing>
+    <p:tnLst>
+      <p:par>
+        <p:cTn id="1" dur="indefinite" restart="never" nodeType="tmRoot"/>
+      </p:par>
+    </p:tnLst>
+  </p:timing>
 </p:sld>
 </file>
 
@@ -11127,6 +11180,13 @@
   <p:clrMapOvr>
     <a:masterClrMapping/>
   </p:clrMapOvr>
+  <p:timing>
+    <p:tnLst>
+      <p:par>
+        <p:cTn id="1" dur="indefinite" restart="never" nodeType="tmRoot"/>
+      </p:par>
+    </p:tnLst>
+  </p:timing>
 </p:sld>
 </file>
 
@@ -11356,6 +11416,13 @@
   <p:clrMapOvr>
     <a:masterClrMapping/>
   </p:clrMapOvr>
+  <p:timing>
+    <p:tnLst>
+      <p:par>
+        <p:cTn id="1" dur="indefinite" restart="never" nodeType="tmRoot"/>
+      </p:par>
+    </p:tnLst>
+  </p:timing>
 </p:sld>
 </file>
 
@@ -11557,6 +11624,13 @@
   <p:clrMapOvr>
     <a:masterClrMapping/>
   </p:clrMapOvr>
+  <p:timing>
+    <p:tnLst>
+      <p:par>
+        <p:cTn id="1" dur="indefinite" restart="never" nodeType="tmRoot"/>
+      </p:par>
+    </p:tnLst>
+  </p:timing>
 </p:sld>
 </file>
 
@@ -11620,6 +11694,13 @@
   <p:clrMapOvr>
     <a:masterClrMapping/>
   </p:clrMapOvr>
+  <p:timing>
+    <p:tnLst>
+      <p:par>
+        <p:cTn id="1" dur="indefinite" restart="never" nodeType="tmRoot"/>
+      </p:par>
+    </p:tnLst>
+  </p:timing>
 </p:sld>
 </file>
 
@@ -11652,7 +11733,7 @@
         </p:nvSpPr>
         <p:spPr>
           <a:xfrm>
-            <a:off x="311700" y="162750"/>
+            <a:off x="311700" y="10350"/>
             <a:ext cx="8520600" cy="626100"/>
           </a:xfrm>
           <a:prstGeom prst="rect">
@@ -11690,8 +11771,8 @@
         </p:nvSpPr>
         <p:spPr>
           <a:xfrm>
-            <a:off x="529350" y="3577175"/>
-            <a:ext cx="8085300" cy="1266000"/>
+            <a:off x="5652525" y="1066450"/>
+            <a:ext cx="3149400" cy="1522200"/>
           </a:xfrm>
           <a:prstGeom prst="rect">
             <a:avLst/>
@@ -11718,7 +11799,7 @@
               <a:buChar char="•"/>
             </a:pPr>
             <a:r>
-              <a:rPr lang="en" sz="1400" dirty="0">
+              <a:rPr lang="en" sz="1400">
                 <a:solidFill>
                   <a:srgbClr val="000000"/>
                 </a:solidFill>
@@ -11727,7 +11808,7 @@
                 <a:cs typeface="Arial"/>
                 <a:sym typeface="Arial"/>
               </a:rPr>
-              <a:t>More requests are made during summer, fewer requests during winter </a:t>
+              <a:t>More requests are made during summer, fewer requests made during winter </a:t>
             </a:r>
           </a:p>
           <a:p>
@@ -11755,71 +11836,37 @@
                 <a:cs typeface="Arial"/>
                 <a:sym typeface="Arial"/>
               </a:rPr>
-              <a:t>People tend to be more active in summer than in winter</a:t>
+              <a:t>People are more active in summer</a:t>
             </a:r>
           </a:p>
           <a:p>
-            <a:pPr marL="457200" lvl="0" indent="-317500" rtl="0">
+            <a:pPr marL="285750" lvl="0" indent="-285750" rtl="0">
               <a:spcBef>
                 <a:spcPts val="0"/>
               </a:spcBef>
               <a:spcAft>
                 <a:spcPts val="0"/>
               </a:spcAft>
-              <a:buClr>
-                <a:srgbClr val="000000"/>
-              </a:buClr>
-              <a:buSzPct val="100000"/>
               <a:buFont typeface="Arial" charset="0"/>
               <a:buChar char="•"/>
             </a:pPr>
-            <a:r>
-              <a:rPr lang="en" sz="1400" dirty="0">
-                <a:solidFill>
-                  <a:srgbClr val="000000"/>
-                </a:solidFill>
-                <a:latin typeface="Arial"/>
-                <a:ea typeface="Arial"/>
-                <a:cs typeface="Arial"/>
-                <a:sym typeface="Arial"/>
-              </a:rPr>
-              <a:t>Fewer requests in November and December because of holidays (Thanksgiving, Christmas) </a:t>
-            </a:r>
-          </a:p>
-          <a:p>
-            <a:pPr marL="457200" lvl="0" indent="-317500" rtl="0">
-              <a:spcBef>
-                <a:spcPts val="0"/>
-              </a:spcBef>
-              <a:spcAft>
-                <a:spcPts val="0"/>
-              </a:spcAft>
-              <a:buClr>
+            <a:endParaRPr sz="1400" dirty="0">
+              <a:solidFill>
                 <a:srgbClr val="000000"/>
-              </a:buClr>
-              <a:buSzPct val="100000"/>
+              </a:solidFill>
+              <a:latin typeface="Arial"/>
+              <a:ea typeface="Arial"/>
+              <a:cs typeface="Arial"/>
+              <a:sym typeface="Arial"/>
+            </a:endParaRPr>
+          </a:p>
+          <a:p>
+            <a:pPr marL="285750" lvl="0" indent="-285750">
+              <a:spcBef>
+                <a:spcPts val="0"/>
+              </a:spcBef>
               <a:buFont typeface="Arial" charset="0"/>
               <a:buChar char="•"/>
-            </a:pPr>
-            <a:r>
-              <a:rPr lang="en" sz="1400" dirty="0">
-                <a:solidFill>
-                  <a:srgbClr val="000000"/>
-                </a:solidFill>
-                <a:latin typeface="Arial"/>
-                <a:ea typeface="Arial"/>
-                <a:cs typeface="Arial"/>
-                <a:sym typeface="Arial"/>
-              </a:rPr>
-              <a:t>More requests on weekdays, fewer on weekends</a:t>
-            </a:r>
-          </a:p>
-          <a:p>
-            <a:pPr lvl="0">
-              <a:spcBef>
-                <a:spcPts val="0"/>
-              </a:spcBef>
-              <a:buNone/>
             </a:pPr>
             <a:endParaRPr sz="1400" dirty="0"/>
           </a:p>
@@ -11841,8 +11888,8 @@
         </p:blipFill>
         <p:spPr>
           <a:xfrm>
-            <a:off x="435775" y="865050"/>
-            <a:ext cx="3630075" cy="2434600"/>
+            <a:off x="311696" y="958275"/>
+            <a:ext cx="5493224" cy="3684149"/>
           </a:xfrm>
           <a:prstGeom prst="rect">
             <a:avLst/>
@@ -11853,39 +11900,23 @@
           </a:ln>
         </p:spPr>
       </p:pic>
-      <p:pic>
-        <p:nvPicPr>
-          <p:cNvPr id="104" name="Shape 104" descr="Screen Shot 2016-12-05 at 7.10.42 PM.png"/>
-          <p:cNvPicPr preferRelativeResize="0"/>
-          <p:nvPr/>
-        </p:nvPicPr>
-        <p:blipFill>
-          <a:blip r:embed="rId4">
-            <a:alphaModFix/>
-          </a:blip>
-          <a:stretch>
-            <a:fillRect/>
-          </a:stretch>
-        </p:blipFill>
-        <p:spPr>
-          <a:xfrm>
-            <a:off x="4561149" y="865050"/>
-            <a:ext cx="3630074" cy="2330631"/>
-          </a:xfrm>
-          <a:prstGeom prst="rect">
-            <a:avLst/>
-          </a:prstGeom>
-          <a:noFill/>
-          <a:ln>
-            <a:noFill/>
-          </a:ln>
-        </p:spPr>
-      </p:pic>
     </p:spTree>
+    <p:extLst>
+      <p:ext uri="{BB962C8B-B14F-4D97-AF65-F5344CB8AC3E}">
+        <p14:creationId xmlns:p14="http://schemas.microsoft.com/office/powerpoint/2010/main" val="568659631"/>
+      </p:ext>
+    </p:extLst>
   </p:cSld>
   <p:clrMapOvr>
     <a:masterClrMapping/>
   </p:clrMapOvr>
+  <p:timing>
+    <p:tnLst>
+      <p:par>
+        <p:cTn id="1" dur="indefinite" restart="never" nodeType="tmRoot"/>
+      </p:par>
+    </p:tnLst>
+  </p:timing>
 </p:sld>
 </file>
 
@@ -11894,7 +11925,7 @@
   <p:cSld>
     <p:spTree>
       <p:nvGrpSpPr>
-        <p:cNvPr id="1" name="Shape 108"/>
+        <p:cNvPr id="1" name="Shape 107"/>
         <p:cNvGrpSpPr/>
         <p:nvPr/>
       </p:nvGrpSpPr>
@@ -11906,157 +11937,9 @@
           <a:chExt cx="0" cy="0"/>
         </a:xfrm>
       </p:grpSpPr>
-      <p:sp>
-        <p:nvSpPr>
-          <p:cNvPr id="109" name="Shape 109"/>
-          <p:cNvSpPr txBox="1">
-            <a:spLocks noGrp="1"/>
-          </p:cNvSpPr>
-          <p:nvPr>
-            <p:ph type="title"/>
-          </p:nvPr>
-        </p:nvSpPr>
-        <p:spPr>
-          <a:xfrm>
-            <a:off x="311700" y="391350"/>
-            <a:ext cx="8520600" cy="626100"/>
-          </a:xfrm>
-          <a:prstGeom prst="rect">
-            <a:avLst/>
-          </a:prstGeom>
-        </p:spPr>
-        <p:txBody>
-          <a:bodyPr lIns="91425" tIns="91425" rIns="91425" bIns="91425" anchor="t" anchorCtr="0">
-            <a:noAutofit/>
-          </a:bodyPr>
-          <a:lstStyle/>
-          <a:p>
-            <a:pPr lvl="0">
-              <a:spcBef>
-                <a:spcPts val="0"/>
-              </a:spcBef>
-              <a:buNone/>
-            </a:pPr>
-            <a:r>
-              <a:rPr lang="en"/>
-              <a:t>Distribution of Requests</a:t>
-            </a:r>
-          </a:p>
-        </p:txBody>
-      </p:sp>
-      <p:sp>
-        <p:nvSpPr>
-          <p:cNvPr id="110" name="Shape 110"/>
-          <p:cNvSpPr txBox="1">
-            <a:spLocks noGrp="1"/>
-          </p:cNvSpPr>
-          <p:nvPr>
-            <p:ph type="body" idx="1"/>
-          </p:nvPr>
-        </p:nvSpPr>
-        <p:spPr>
-          <a:xfrm>
-            <a:off x="5621150" y="1152475"/>
-            <a:ext cx="3210900" cy="3416400"/>
-          </a:xfrm>
-          <a:prstGeom prst="rect">
-            <a:avLst/>
-          </a:prstGeom>
-        </p:spPr>
-        <p:txBody>
-          <a:bodyPr lIns="91425" tIns="91425" rIns="91425" bIns="91425" anchor="t" anchorCtr="0">
-            <a:noAutofit/>
-          </a:bodyPr>
-          <a:lstStyle/>
-          <a:p>
-            <a:pPr marL="457200" lvl="0" indent="-317500" rtl="0">
-              <a:spcBef>
-                <a:spcPts val="0"/>
-              </a:spcBef>
-              <a:spcAft>
-                <a:spcPts val="0"/>
-              </a:spcAft>
-              <a:buClr>
-                <a:srgbClr val="000000"/>
-              </a:buClr>
-              <a:buSzPct val="100000"/>
-              <a:buFont typeface="Arial" charset="0"/>
-              <a:buChar char="•"/>
-            </a:pPr>
-            <a:r>
-              <a:rPr lang="en" sz="1400" dirty="0">
-                <a:solidFill>
-                  <a:srgbClr val="000000"/>
-                </a:solidFill>
-                <a:latin typeface="Arial"/>
-                <a:ea typeface="Arial"/>
-                <a:cs typeface="Arial"/>
-                <a:sym typeface="Arial"/>
-              </a:rPr>
-              <a:t>Most requests are made during working hours (from 7am to 5pm) and during weekdays (Monday through Friday)</a:t>
-            </a:r>
-          </a:p>
-          <a:p>
-            <a:pPr marL="457200" lvl="0" indent="-317500" rtl="0">
-              <a:spcBef>
-                <a:spcPts val="0"/>
-              </a:spcBef>
-              <a:spcAft>
-                <a:spcPts val="0"/>
-              </a:spcAft>
-              <a:buClr>
-                <a:srgbClr val="000000"/>
-              </a:buClr>
-              <a:buSzPct val="100000"/>
-              <a:buFont typeface="Arial" charset="0"/>
-              <a:buChar char="•"/>
-            </a:pPr>
-            <a:r>
-              <a:rPr lang="en" sz="1400" dirty="0">
-                <a:solidFill>
-                  <a:srgbClr val="000000"/>
-                </a:solidFill>
-                <a:latin typeface="Arial"/>
-                <a:ea typeface="Arial"/>
-                <a:cs typeface="Arial"/>
-                <a:sym typeface="Arial"/>
-              </a:rPr>
-              <a:t>This might be related with City of LA employees’ working hours. More requests are created when the City of LA employees are working</a:t>
-            </a:r>
-          </a:p>
-          <a:p>
-            <a:pPr marL="457200" lvl="0" indent="-317500">
-              <a:spcBef>
-                <a:spcPts val="0"/>
-              </a:spcBef>
-              <a:spcAft>
-                <a:spcPts val="0"/>
-              </a:spcAft>
-              <a:buClr>
-                <a:srgbClr val="000000"/>
-              </a:buClr>
-              <a:buSzPct val="100000"/>
-              <a:buFont typeface="Arial" charset="0"/>
-              <a:buChar char="•"/>
-            </a:pPr>
-            <a:r>
-              <a:rPr lang="en" sz="1400" dirty="0">
-                <a:solidFill>
-                  <a:srgbClr val="000000"/>
-                </a:solidFill>
-                <a:latin typeface="Arial"/>
-                <a:ea typeface="Arial"/>
-                <a:cs typeface="Arial"/>
-                <a:sym typeface="Arial"/>
-              </a:rPr>
-              <a:t>People like to submit requests during work</a:t>
-            </a:r>
-          </a:p>
-        </p:txBody>
-      </p:sp>
       <p:pic>
         <p:nvPicPr>
-          <p:cNvPr id="111" name="Shape 111" descr="Screen Shot 2016-12-05 at 7.16.35 PM.png"/>
+          <p:cNvPr id="108" name="Shape 108" descr="Screen Shot 2016-12-05 at 7.16.35 PM.png"/>
           <p:cNvPicPr preferRelativeResize="0"/>
           <p:nvPr/>
         </p:nvPicPr>
@@ -12070,8 +11953,8 @@
         </p:blipFill>
         <p:spPr>
           <a:xfrm>
-            <a:off x="397325" y="1152475"/>
-            <a:ext cx="5138100" cy="3416399"/>
+            <a:off x="355825" y="1006750"/>
+            <a:ext cx="5755550" cy="3826949"/>
           </a:xfrm>
           <a:prstGeom prst="rect">
             <a:avLst/>
@@ -12082,11 +11965,144 @@
           </a:ln>
         </p:spPr>
       </p:pic>
+      <p:sp>
+        <p:nvSpPr>
+          <p:cNvPr id="109" name="Shape 109"/>
+          <p:cNvSpPr txBox="1">
+            <a:spLocks noGrp="1"/>
+          </p:cNvSpPr>
+          <p:nvPr>
+            <p:ph type="title"/>
+          </p:nvPr>
+        </p:nvSpPr>
+        <p:spPr>
+          <a:xfrm>
+            <a:off x="311700" y="238950"/>
+            <a:ext cx="8520600" cy="626100"/>
+          </a:xfrm>
+          <a:prstGeom prst="rect">
+            <a:avLst/>
+          </a:prstGeom>
+        </p:spPr>
+        <p:txBody>
+          <a:bodyPr lIns="91425" tIns="91425" rIns="91425" bIns="91425" anchor="t" anchorCtr="0">
+            <a:noAutofit/>
+          </a:bodyPr>
+          <a:lstStyle/>
+          <a:p>
+            <a:pPr lvl="0" rtl="0">
+              <a:spcBef>
+                <a:spcPts val="0"/>
+              </a:spcBef>
+              <a:buNone/>
+            </a:pPr>
+            <a:r>
+              <a:rPr lang="en"/>
+              <a:t>Distribution of Requests</a:t>
+            </a:r>
+          </a:p>
+        </p:txBody>
+      </p:sp>
+      <p:sp>
+        <p:nvSpPr>
+          <p:cNvPr id="110" name="Shape 110"/>
+          <p:cNvSpPr txBox="1"/>
+          <p:nvPr/>
+        </p:nvSpPr>
+        <p:spPr>
+          <a:xfrm>
+            <a:off x="5888075" y="1268875"/>
+            <a:ext cx="2842500" cy="3302700"/>
+          </a:xfrm>
+          <a:prstGeom prst="rect">
+            <a:avLst/>
+          </a:prstGeom>
+          <a:noFill/>
+          <a:ln>
+            <a:noFill/>
+          </a:ln>
+        </p:spPr>
+        <p:txBody>
+          <a:bodyPr lIns="91425" tIns="91425" rIns="91425" bIns="91425" anchor="t" anchorCtr="0">
+            <a:noAutofit/>
+          </a:bodyPr>
+          <a:lstStyle/>
+          <a:p>
+            <a:pPr marL="457200" lvl="0" indent="-317500" rtl="0">
+              <a:lnSpc>
+                <a:spcPct val="115000"/>
+              </a:lnSpc>
+              <a:spcBef>
+                <a:spcPts val="0"/>
+              </a:spcBef>
+              <a:buClr>
+                <a:srgbClr val="000000"/>
+              </a:buClr>
+              <a:buFont typeface="Arial" charset="0"/>
+              <a:buChar char="•"/>
+            </a:pPr>
+            <a:r>
+              <a:rPr lang="en"/>
+              <a:t>Darker color represents more requests </a:t>
+            </a:r>
+          </a:p>
+          <a:p>
+            <a:pPr marL="457200" lvl="0" indent="-317500" rtl="0">
+              <a:lnSpc>
+                <a:spcPct val="115000"/>
+              </a:lnSpc>
+              <a:spcBef>
+                <a:spcPts val="0"/>
+              </a:spcBef>
+              <a:buClr>
+                <a:srgbClr val="000000"/>
+              </a:buClr>
+              <a:buFont typeface="Arial" charset="0"/>
+              <a:buChar char="•"/>
+            </a:pPr>
+            <a:r>
+              <a:rPr lang="en"/>
+              <a:t>Most requests are made during working hours (from 7am to 5pm) and during weekdays (Monday through Friday)</a:t>
+            </a:r>
+          </a:p>
+          <a:p>
+            <a:pPr marL="457200" lvl="0" indent="-317500" rtl="0">
+              <a:lnSpc>
+                <a:spcPct val="115000"/>
+              </a:lnSpc>
+              <a:spcBef>
+                <a:spcPts val="0"/>
+              </a:spcBef>
+              <a:buClr>
+                <a:srgbClr val="000000"/>
+              </a:buClr>
+              <a:buFont typeface="Arial" charset="0"/>
+              <a:buChar char="•"/>
+            </a:pPr>
+            <a:r>
+              <a:rPr lang="en"/>
+              <a:t>City of LA employees’ working hours; People like to submit requests during work </a:t>
+            </a:r>
+          </a:p>
+        </p:txBody>
+      </p:sp>
     </p:spTree>
+    <p:extLst>
+      <p:ext uri="{BB962C8B-B14F-4D97-AF65-F5344CB8AC3E}">
+        <p14:creationId xmlns:p14="http://schemas.microsoft.com/office/powerpoint/2010/main" val="146134309"/>
+      </p:ext>
+    </p:extLst>
   </p:cSld>
   <p:clrMapOvr>
     <a:masterClrMapping/>
   </p:clrMapOvr>
+  <p:timing>
+    <p:tnLst>
+      <p:par>
+        <p:cTn id="1" dur="indefinite" restart="never" nodeType="tmRoot"/>
+      </p:par>
+    </p:tnLst>
+  </p:timing>
 </p:sld>
 </file>
 

</xml_diff>